<commit_message>
Photon PPT Data Update
- Delete regional settings system
  with dropdown

- Edit popup content
</commit_message>
<xml_diff>
--- a/Assets/Class/Photon Server/PPT Data/Photon Lobby.pptx
+++ b/Assets/Class/Photon Server/PPT Data/Photon Lobby.pptx
@@ -2,7 +2,7 @@
 <file path=ppt/presentation.xml><?xml version="1.0" encoding="utf-8"?>
 <p:presentation xmlns:a="http://schemas.openxmlformats.org/drawingml/2006/main" xmlns:r="http://schemas.openxmlformats.org/officeDocument/2006/relationships" xmlns:p="http://schemas.openxmlformats.org/presentationml/2006/main" xmlns:p14="http://schemas.microsoft.com/office/powerpoint/2010/main" saveSubsetFonts="1" firstSlideNum="0">
   <p:sldMasterIdLst>
-    <p:sldMasterId id="2147486912" r:id="rId12"/>
+    <p:sldMasterId id="2147486913" r:id="rId12"/>
   </p:sldMasterIdLst>
   <p:notesMasterIdLst>
     <p:notesMasterId r:id="rId14"/>
@@ -10,19 +10,19 @@
   <p:sldIdLst>
     <p:sldId id="311" r:id="rId16"/>
     <p:sldId id="318" r:id="rId17"/>
-    <p:sldId id="305" r:id="rId18"/>
-    <p:sldId id="300" r:id="rId19"/>
-    <p:sldId id="313" r:id="rId21"/>
-    <p:sldId id="325" r:id="rId23"/>
-    <p:sldId id="326" r:id="rId25"/>
-    <p:sldId id="327" r:id="rId27"/>
-    <p:sldId id="328" r:id="rId29"/>
-    <p:sldId id="329" r:id="rId31"/>
-    <p:sldId id="330" r:id="rId33"/>
-    <p:sldId id="331" r:id="rId35"/>
-    <p:sldId id="332" r:id="rId37"/>
-    <p:sldId id="333" r:id="rId39"/>
-    <p:sldId id="334" r:id="rId41"/>
+    <p:sldId id="305" r:id="rId19"/>
+    <p:sldId id="300" r:id="rId21"/>
+    <p:sldId id="313" r:id="rId23"/>
+    <p:sldId id="325" r:id="rId25"/>
+    <p:sldId id="326" r:id="rId27"/>
+    <p:sldId id="327" r:id="rId29"/>
+    <p:sldId id="328" r:id="rId31"/>
+    <p:sldId id="329" r:id="rId33"/>
+    <p:sldId id="330" r:id="rId35"/>
+    <p:sldId id="331" r:id="rId37"/>
+    <p:sldId id="332" r:id="rId39"/>
+    <p:sldId id="333" r:id="rId41"/>
+    <p:sldId id="334" r:id="rId43"/>
   </p:sldIdLst>
   <p:sldSz cx="12192000" cy="6858000"/>
   <p:notesSz cx="6858000" cy="9144000"/>
@@ -7524,7 +7524,7 @@
         <p:spPr>
           <a:xfrm rot="0">
             <a:off x="4331335" y="445135"/>
-            <a:ext cx="3536315" cy="554990"/>
+            <a:ext cx="3524885" cy="554990"/>
           </a:xfrm>
           <a:prstGeom prst="rect"/>
           <a:noFill/>
@@ -7539,16 +7539,23 @@
           </a:bodyPr>
           <a:lstStyle/>
           <a:p>
-            <a:pPr marL="0" indent="0" algn="l" latinLnBrk="0" hangingPunct="1">
-              <a:buFontTx/>
-              <a:buNone/>
-            </a:pPr>
-            <a:r>
-              <a:rPr lang="ko-KR" sz="3000" b="1">
-                <a:latin typeface="맑은 고딕" charset="0"/>
-                <a:ea typeface="맑은 고딕" charset="0"/>
-              </a:rPr>
-              <a:t>다섯 번째 튜토리얼</a:t>
+            <a:pPr marL="0" indent="0" algn="ctr" latinLnBrk="0" hangingPunct="1">
+              <a:buFontTx/>
+              <a:buNone/>
+            </a:pPr>
+            <a:r>
+              <a:rPr lang="ko-KR" sz="2500" b="1">
+                <a:latin typeface="나눔바른고딕" charset="0"/>
+                <a:ea typeface="나눔바른고딕" charset="0"/>
+              </a:rPr>
+              <a:t>첫</a:t>
+            </a:r>
+            <a:r>
+              <a:rPr lang="ko-KR" sz="2500" b="1">
+                <a:latin typeface="나눔바른고딕" charset="0"/>
+                <a:ea typeface="나눔바른고딕" charset="0"/>
+              </a:rPr>
+              <a:t> 번째 튜토리얼</a:t>
             </a:r>
             <a:r>
               <a:rPr lang="ko-KR" sz="3000" b="1">
@@ -7573,9 +7580,9 @@
           <p:nvPr/>
         </p:nvSpPr>
         <p:spPr>
-          <a:xfrm>
-            <a:off x="6816725" y="5549265"/>
-            <a:ext cx="4116070" cy="677545"/>
+          <a:xfrm rot="0">
+            <a:off x="1200785" y="5084445"/>
+            <a:ext cx="4116705" cy="954405"/>
           </a:xfrm>
           <a:prstGeom prst="rect"/>
           <a:noFill/>
@@ -7602,17 +7609,7 @@
                 <a:latin typeface="맑은 고딕" charset="0"/>
                 <a:ea typeface="맑은 고딕" charset="0"/>
               </a:rPr>
-              <a:t>1</a:t>
-            </a:r>
-            <a:r>
-              <a:rPr lang="ko-KR" sz="2000" b="1">
-                <a:solidFill>
-                  <a:srgbClr val="0611F2"/>
-                </a:solidFill>
-                <a:latin typeface="맑은 고딕" charset="0"/>
-                <a:ea typeface="맑은 고딕" charset="0"/>
-              </a:rPr>
-              <a:t>0</a:t>
+              <a:t>1.</a:t>
             </a:r>
             <a:r>
               <a:rPr sz="2000" b="1">
@@ -7622,24 +7619,38 @@
                 <a:latin typeface="맑은 고딕" charset="0"/>
                 <a:ea typeface="맑은 고딕" charset="0"/>
               </a:rPr>
-              <a:t>. </a:t>
+              <a:t> </a:t>
             </a:r>
             <a:r>
               <a:rPr sz="1800">
                 <a:latin typeface="맑은 고딕" charset="0"/>
                 <a:ea typeface="맑은 고딕" charset="0"/>
               </a:rPr>
-              <a:t>이</a:t>
+              <a:t>첫 번째로</a:t>
+            </a:r>
+            <a:r>
+              <a:rPr sz="1800">
+                <a:latin typeface="맑은 고딕" charset="0"/>
+                <a:ea typeface="맑은 고딕" charset="0"/>
+              </a:rPr>
+              <a:t> </a:t>
             </a:r>
             <a:r>
               <a:rPr lang="ko-KR" sz="1800">
                 <a:latin typeface="맑은 고딕" charset="0"/>
                 <a:ea typeface="맑은 고딕" charset="0"/>
               </a:rPr>
-              <a:t>제</a:t>
-            </a:r>
-            <a:r>
-              <a:rPr sz="1800">
+              <a:t>UI에서 Image를 생성한 </a:t>
+            </a:r>
+            <a:r>
+              <a:rPr lang="ko-KR" sz="1800">
+                <a:latin typeface="맑은 고딕" charset="0"/>
+                <a:ea typeface="맑은 고딕" charset="0"/>
+              </a:rPr>
+              <a:t>다음</a:t>
+            </a:r>
+            <a:r>
+              <a:rPr lang="ko-KR" sz="1800">
                 <a:latin typeface="맑은 고딕" charset="0"/>
                 <a:ea typeface="맑은 고딕" charset="0"/>
               </a:rPr>
@@ -7650,7 +7661,21 @@
                 <a:latin typeface="맑은 고딕" charset="0"/>
                 <a:ea typeface="맑은 고딕" charset="0"/>
               </a:rPr>
-              <a:t>UI에서 Image를 생성한 다음 Ground라는 이름으로 정의합니다.</a:t>
+              <a:t>Ground라는</a:t>
+            </a:r>
+            <a:r>
+              <a:rPr lang="ko-KR" sz="1800">
+                <a:latin typeface="맑은 고딕" charset="0"/>
+                <a:ea typeface="맑은 고딕" charset="0"/>
+              </a:rPr>
+              <a:t> 이름으로 </a:t>
+            </a:r>
+            <a:r>
+              <a:rPr lang="ko-KR" sz="1800">
+                <a:latin typeface="맑은 고딕" charset="0"/>
+                <a:ea typeface="맑은 고딕" charset="0"/>
+              </a:rPr>
+              <a:t>정의합니다.</a:t>
             </a:r>
             <a:endParaRPr lang="ko-KR" altLang="en-US" sz="1800">
               <a:latin typeface="맑은 고딕" charset="0"/>
@@ -7661,7 +7686,7 @@
       </p:sp>
       <p:pic>
         <p:nvPicPr>
-          <p:cNvPr id="31" name="그림 2"/>
+          <p:cNvPr id="31" name="그림 2" descr="C:/Users/Admin1/AppData/Roaming/PolarisOffice/ETemp/14756_24383200/fImage185003101478.png"/>
           <p:cNvPicPr>
             <a:picLocks noChangeAspect="1"/>
           </p:cNvPicPr>
@@ -7681,8 +7706,8 @@
         </p:blipFill>
         <p:spPr>
           <a:xfrm rot="0">
-            <a:off x="6816725" y="1521460"/>
-            <a:ext cx="2511425" cy="3841115"/>
+            <a:off x="1240790" y="1472565"/>
+            <a:ext cx="2635885" cy="3394710"/>
           </a:xfrm>
           <a:prstGeom prst="roundRect"/>
           <a:solidFill>
@@ -7692,17 +7717,17 @@
       </p:pic>
       <p:pic>
         <p:nvPicPr>
-          <p:cNvPr id="32" name="그림 3"/>
+          <p:cNvPr id="32" name="그림 3" descr="C:/Users/Admin1/AppData/Roaming/PolarisOffice/ETemp/14756_24383200/fImage539725841.png"/>
           <p:cNvPicPr>
             <a:picLocks noChangeAspect="1"/>
           </p:cNvPicPr>
           <p:nvPr/>
         </p:nvPicPr>
         <p:blipFill rotWithShape="1">
-          <a:blip r:embed="rId12" cstate="print">
+          <a:blip r:embed="rId12" cstate="hqprint">
             <a:extLst>
               <a:ext uri="{28A0092B-C50C-407E-A947-70E740481C1C}">
-                <a14:useLocalDpi xmlns:a14="http://schemas.microsoft.com/office/drawing/2010/main" val="0"/>
+                <a14:useLocalDpi xmlns:a14="http://schemas.microsoft.com/office/drawing/2010/main"/>
               </a:ext>
             </a:extLst>
           </a:blip>
@@ -7712,8 +7737,8 @@
         </p:blipFill>
         <p:spPr>
           <a:xfrm rot="0">
-            <a:off x="9484995" y="2244090"/>
-            <a:ext cx="1438275" cy="2361565"/>
+            <a:off x="4005580" y="2110105"/>
+            <a:ext cx="1353185" cy="2065655"/>
           </a:xfrm>
           <a:prstGeom prst="roundRect"/>
           <a:solidFill>

</xml_diff>